<commit_message>
DJR:Added motor basic code
</commit_message>
<xml_diff>
--- a/meeting-3-conditionals-motor/Girl Scouts LEGO Robotics - Meeting 3 - Conditionals.pptx
+++ b/meeting-3-conditionals-motor/Girl Scouts LEGO Robotics - Meeting 3 - Conditionals.pptx
@@ -9738,7 +9738,7 @@
             <a:pPr lvl="1"/>
             <a:r>
               <a:rPr lang="en-US" dirty="0" smtClean="0"/>
-              <a:t>Did you do your homework?</a:t>
+              <a:t>Any trouble with your homework?</a:t>
             </a:r>
             <a:endParaRPr lang="en-US" dirty="0" smtClean="0"/>
           </a:p>
@@ -9867,12 +9867,56 @@
             <p:ph idx="1"/>
           </p:nvPr>
         </p:nvSpPr>
-        <p:spPr/>
+        <p:spPr>
+          <a:xfrm>
+            <a:off x="1043492" y="2323653"/>
+            <a:ext cx="6777317" cy="1638748"/>
+          </a:xfrm>
+        </p:spPr>
         <p:txBody>
           <a:bodyPr/>
           <a:lstStyle/>
           <a:p>
             <a:pPr lvl="1"/>
+            <a:r>
+              <a:rPr lang="en-US" dirty="0"/>
+              <a:t>m = </a:t>
+            </a:r>
+            <a:r>
+              <a:rPr lang="en-US" dirty="0" err="1"/>
+              <a:t>LargeMotor</a:t>
+            </a:r>
+            <a:r>
+              <a:rPr lang="en-US" dirty="0"/>
+              <a:t>('</a:t>
+            </a:r>
+            <a:r>
+              <a:rPr lang="en-US" dirty="0" err="1"/>
+              <a:t>outC</a:t>
+            </a:r>
+            <a:r>
+              <a:rPr lang="en-US" dirty="0"/>
+              <a:t>')</a:t>
+            </a:r>
+          </a:p>
+          <a:p>
+            <a:pPr lvl="1"/>
+            <a:r>
+              <a:rPr lang="en-US" dirty="0" err="1"/>
+              <a:t>m.run_to_rel_pos</a:t>
+            </a:r>
+            <a:r>
+              <a:rPr lang="en-US" dirty="0"/>
+              <a:t>(</a:t>
+            </a:r>
+            <a:r>
+              <a:rPr lang="en-US" dirty="0" err="1"/>
+              <a:t>position_sp</a:t>
+            </a:r>
+            <a:r>
+              <a:rPr lang="en-US" dirty="0"/>
+              <a:t>=360,speed_sp=900,stop_action="hold")</a:t>
+            </a:r>
             <a:endParaRPr lang="en-US" dirty="0"/>
           </a:p>
         </p:txBody>
@@ -9954,7 +9998,47 @@
                   <a:schemeClr val="bg1"/>
                 </a:solidFill>
               </a:rPr>
-              <a:t>&gt;&gt;&gt;     print(“Allie”)</a:t>
+              <a:t>&gt;&gt;&gt;     </a:t>
+            </a:r>
+            <a:r>
+              <a:rPr lang="en-US" dirty="0">
+                <a:solidFill>
+                  <a:schemeClr val="bg1"/>
+                </a:solidFill>
+              </a:rPr>
+              <a:t>m = </a:t>
+            </a:r>
+            <a:r>
+              <a:rPr lang="en-US" dirty="0" err="1">
+                <a:solidFill>
+                  <a:schemeClr val="bg1"/>
+                </a:solidFill>
+              </a:rPr>
+              <a:t>LargeMotor</a:t>
+            </a:r>
+            <a:r>
+              <a:rPr lang="en-US" dirty="0">
+                <a:solidFill>
+                  <a:schemeClr val="bg1"/>
+                </a:solidFill>
+              </a:rPr>
+              <a:t>('</a:t>
+            </a:r>
+            <a:r>
+              <a:rPr lang="en-US" dirty="0" err="1">
+                <a:solidFill>
+                  <a:schemeClr val="bg1"/>
+                </a:solidFill>
+              </a:rPr>
+              <a:t>outC</a:t>
+            </a:r>
+            <a:r>
+              <a:rPr lang="en-US" dirty="0" smtClean="0">
+                <a:solidFill>
+                  <a:schemeClr val="bg1"/>
+                </a:solidFill>
+              </a:rPr>
+              <a:t>')</a:t>
             </a:r>
             <a:endParaRPr lang="en-US" dirty="0">
               <a:solidFill>
@@ -9964,27 +10048,84 @@
           </a:p>
           <a:p>
             <a:r>
+              <a:rPr lang="en-US" dirty="0">
+                <a:solidFill>
+                  <a:schemeClr val="bg1"/>
+                </a:solidFill>
+              </a:rPr>
+              <a:t>&gt;&gt;&gt; </a:t>
+            </a:r>
+            <a:r>
+              <a:rPr lang="en-US" dirty="0" err="1">
+                <a:solidFill>
+                  <a:schemeClr val="bg1"/>
+                </a:solidFill>
+              </a:rPr>
+              <a:t>m.run_to_rel_pos</a:t>
+            </a:r>
+            <a:r>
+              <a:rPr lang="en-US" dirty="0">
+                <a:solidFill>
+                  <a:schemeClr val="bg1"/>
+                </a:solidFill>
+              </a:rPr>
+              <a:t>(</a:t>
+            </a:r>
+            <a:r>
+              <a:rPr lang="en-US" dirty="0" err="1">
+                <a:solidFill>
+                  <a:schemeClr val="bg1"/>
+                </a:solidFill>
+              </a:rPr>
+              <a:t>position_sp</a:t>
+            </a:r>
+            <a:r>
+              <a:rPr lang="en-US" dirty="0">
+                <a:solidFill>
+                  <a:schemeClr val="bg1"/>
+                </a:solidFill>
+              </a:rPr>
+              <a:t>=360</a:t>
+            </a:r>
+            <a:r>
               <a:rPr lang="en-US" dirty="0" smtClean="0">
                 <a:solidFill>
                   <a:schemeClr val="bg1"/>
                 </a:solidFill>
               </a:rPr>
-              <a:t>Allie</a:t>
-            </a:r>
-            <a:endParaRPr lang="en-US" dirty="0">
-              <a:solidFill>
-                <a:schemeClr val="bg1"/>
-              </a:solidFill>
-            </a:endParaRPr>
-          </a:p>
-          <a:p>
+              <a:t>, </a:t>
+            </a:r>
+            <a:r>
+              <a:rPr lang="en-US" dirty="0" err="1" smtClean="0">
+                <a:solidFill>
+                  <a:schemeClr val="bg1"/>
+                </a:solidFill>
+              </a:rPr>
+              <a:t>speed_sp</a:t>
+            </a:r>
             <a:r>
               <a:rPr lang="en-US" dirty="0" smtClean="0">
                 <a:solidFill>
                   <a:schemeClr val="bg1"/>
                 </a:solidFill>
               </a:rPr>
-              <a:t>&gt;&gt;&gt;</a:t>
+              <a:t>=900, </a:t>
+            </a:r>
+            <a:r>
+              <a:rPr lang="en-US" dirty="0" err="1" smtClean="0">
+                <a:solidFill>
+                  <a:schemeClr val="bg1"/>
+                </a:solidFill>
+              </a:rPr>
+              <a:t>stop_action</a:t>
+            </a:r>
+            <a:r>
+              <a:rPr lang="en-US" dirty="0">
+                <a:solidFill>
+                  <a:schemeClr val="bg1"/>
+                </a:solidFill>
+              </a:rPr>
+              <a:t>="hold")</a:t>
             </a:r>
             <a:endParaRPr lang="en-US" dirty="0">
               <a:solidFill>
@@ -10118,6 +10259,16 @@
         <p:txBody>
           <a:bodyPr/>
           <a:lstStyle/>
+          <a:p>
+            <a:r>
+              <a:rPr lang="en-US" dirty="0" smtClean="0"/>
+              <a:t>Same things you </a:t>
+            </a:r>
+            <a:r>
+              <a:rPr lang="en-US" smtClean="0"/>
+              <a:t>just learned</a:t>
+            </a:r>
+          </a:p>
           <a:p>
             <a:endParaRPr lang="en-US" dirty="0"/>
           </a:p>

</xml_diff>